<commit_message>
Reading financial statement thoroughly
</commit_message>
<xml_diff>
--- a/AR VR Company/AR VR Company.pptx
+++ b/AR VR Company/AR VR Company.pptx
@@ -7,8 +7,10 @@
   <p:sldIdLst>
     <p:sldId id="256" r:id="rId2"/>
     <p:sldId id="257" r:id="rId3"/>
-    <p:sldId id="258" r:id="rId4"/>
-    <p:sldId id="259" r:id="rId5"/>
+    <p:sldId id="259" r:id="rId4"/>
+    <p:sldId id="260" r:id="rId5"/>
+    <p:sldId id="258" r:id="rId6"/>
+    <p:sldId id="261" r:id="rId7"/>
   </p:sldIdLst>
   <p:sldSz cx="12192000" cy="6858000"/>
   <p:notesSz cx="6858000" cy="9144000"/>
@@ -3548,6 +3550,14 @@
 <file path=ppt/slides/slide3.xml><?xml version="1.0" encoding="utf-8"?>
 <p:sld xmlns:a="http://schemas.openxmlformats.org/drawingml/2006/main" xmlns:r="http://schemas.openxmlformats.org/officeDocument/2006/relationships" xmlns:p="http://schemas.openxmlformats.org/presentationml/2006/main">
   <p:cSld>
+    <p:bg>
+      <p:bgPr>
+        <a:solidFill>
+          <a:schemeClr val="bg1"/>
+        </a:solidFill>
+        <a:effectLst/>
+      </p:bgPr>
+    </p:bg>
     <p:spTree>
       <p:nvGrpSpPr>
         <p:cNvPr id="1" name=""/>
@@ -3567,7 +3577,7 @@
           <p:cNvPr id="2" name="Title 1">
             <a:extLst>
               <a:ext uri="{FF2B5EF4-FFF2-40B4-BE49-F238E27FC236}">
-                <a16:creationId xmlns:a16="http://schemas.microsoft.com/office/drawing/2014/main" id="{871662E3-AD8B-8346-A30B-5AB3899B1678}"/>
+                <a16:creationId xmlns:a16="http://schemas.microsoft.com/office/drawing/2014/main" id="{95872C99-5FC9-C64C-BB06-D6D19BC28B46}"/>
               </a:ext>
             </a:extLst>
           </p:cNvPr>
@@ -3578,24 +3588,39 @@
             <p:ph type="title"/>
           </p:nvPr>
         </p:nvSpPr>
-        <p:spPr/>
-        <p:txBody>
-          <a:bodyPr/>
+        <p:spPr>
+          <a:xfrm>
+            <a:off x="4965430" y="629268"/>
+            <a:ext cx="6586491" cy="1286160"/>
+          </a:xfrm>
+        </p:spPr>
+        <p:txBody>
+          <a:bodyPr anchor="b">
+            <a:normAutofit/>
+          </a:bodyPr>
           <a:lstStyle/>
           <a:p>
             <a:r>
               <a:rPr lang="en-US" dirty="0"/>
-              <a:t>Oculus by Facebook</a:t>
-            </a:r>
-          </a:p>
-        </p:txBody>
-      </p:sp>
-      <p:sp>
-        <p:nvSpPr>
-          <p:cNvPr id="3" name="Content Placeholder 2">
-            <a:extLst>
-              <a:ext uri="{FF2B5EF4-FFF2-40B4-BE49-F238E27FC236}">
-                <a16:creationId xmlns:a16="http://schemas.microsoft.com/office/drawing/2014/main" id="{8728D987-644F-3245-ABA2-B2611EF61EE8}"/>
+              <a:t>HTC </a:t>
+            </a:r>
+            <a:r>
+              <a:rPr lang="en-US" dirty="0" err="1"/>
+              <a:t>Vive</a:t>
+            </a:r>
+            <a:r>
+              <a:rPr lang="en-US" dirty="0"/>
+              <a:t> by HTC</a:t>
+            </a:r>
+          </a:p>
+        </p:txBody>
+      </p:sp>
+      <p:sp>
+        <p:nvSpPr>
+          <p:cNvPr id="9" name="Content Placeholder 8">
+            <a:extLst>
+              <a:ext uri="{FF2B5EF4-FFF2-40B4-BE49-F238E27FC236}">
+                <a16:creationId xmlns:a16="http://schemas.microsoft.com/office/drawing/2014/main" id="{FE25E03D-2C79-4F0E-943D-C4B4C75A851A}"/>
               </a:ext>
             </a:extLst>
           </p:cNvPr>
@@ -3606,33 +3631,175 @@
             <p:ph idx="1"/>
           </p:nvPr>
         </p:nvSpPr>
-        <p:spPr/>
-        <p:txBody>
-          <a:bodyPr/>
-          <a:lstStyle/>
-          <a:p>
-            <a:r>
-              <a:rPr lang="en-ID" dirty="0"/>
-              <a:t>Facebook has pumped billions into VR</a:t>
-            </a:r>
-            <a:endParaRPr lang="en-US" dirty="0">
-              <a:hlinkClick r:id="rId2"/>
-            </a:endParaRPr>
-          </a:p>
-          <a:p>
-            <a:r>
-              <a:rPr lang="en-US" dirty="0">
-                <a:hlinkClick r:id="rId2"/>
+        <p:spPr>
+          <a:xfrm>
+            <a:off x="4965431" y="2438400"/>
+            <a:ext cx="6586489" cy="3785419"/>
+          </a:xfrm>
+        </p:spPr>
+        <p:txBody>
+          <a:bodyPr>
+            <a:normAutofit/>
+          </a:bodyPr>
+          <a:lstStyle/>
+          <a:p>
+            <a:r>
+              <a:rPr lang="en-US" sz="2000" dirty="0"/>
+              <a:t>Introduced for the first time February 2016 and become the new benchmark of VR products.</a:t>
+            </a:r>
+          </a:p>
+          <a:p>
+            <a:r>
+              <a:rPr lang="en-US" sz="2000" dirty="0"/>
+              <a:t>January 2018 business cooperation with Google Inc ($1Billion to HTC)</a:t>
+            </a:r>
+          </a:p>
+          <a:p>
+            <a:r>
+              <a:rPr lang="en-US" sz="2000" dirty="0"/>
+              <a:t>In 2018 Contributed to net income NT$12.0 Billion</a:t>
+            </a:r>
+            <a:r>
+              <a:rPr lang="en-US" sz="2000" dirty="0">
+                <a:solidFill>
+                  <a:schemeClr val="accent6"/>
+                </a:solidFill>
               </a:rPr>
-              <a:t>$100 Million in Revenue</a:t>
-            </a:r>
-            <a:endParaRPr lang="en-US" dirty="0"/>
-          </a:p>
-          <a:p>
-            <a:pPr lvl="1"/>
-            <a:r>
-              <a:rPr lang="en-US" dirty="0"/>
-              <a:t>20% (contributed by users spending on content)</a:t>
+              <a:t> (51% from total)</a:t>
+            </a:r>
+            <a:r>
+              <a:rPr lang="en-US" sz="2000" dirty="0"/>
+              <a:t>, EPS NT$14,72</a:t>
+            </a:r>
+          </a:p>
+          <a:p>
+            <a:endParaRPr lang="en-US" sz="2000" dirty="0"/>
+          </a:p>
+          <a:p>
+            <a:endParaRPr lang="en-US" sz="2000" dirty="0"/>
+          </a:p>
+          <a:p>
+            <a:endParaRPr lang="en-US" sz="2000" dirty="0"/>
+          </a:p>
+        </p:txBody>
+      </p:sp>
+      <p:pic>
+        <p:nvPicPr>
+          <p:cNvPr id="5" name="Content Placeholder 4" descr="A screen shot of a computer&#10;&#10;Description automatically generated">
+            <a:extLst>
+              <a:ext uri="{FF2B5EF4-FFF2-40B4-BE49-F238E27FC236}">
+                <a16:creationId xmlns:a16="http://schemas.microsoft.com/office/drawing/2014/main" id="{58042339-4096-5944-B9E8-04B91EB71AAA}"/>
+              </a:ext>
+            </a:extLst>
+          </p:cNvPr>
+          <p:cNvPicPr>
+            <a:picLocks noChangeAspect="1"/>
+          </p:cNvPicPr>
+          <p:nvPr/>
+        </p:nvPicPr>
+        <p:blipFill rotWithShape="1">
+          <a:blip r:embed="rId2"/>
+          <a:srcRect l="6445"/>
+          <a:stretch/>
+        </p:blipFill>
+        <p:spPr>
+          <a:xfrm>
+            <a:off x="20" y="10"/>
+            <a:ext cx="4635571" cy="6857990"/>
+          </a:xfrm>
+          <a:prstGeom prst="rect">
+            <a:avLst/>
+          </a:prstGeom>
+          <a:effectLst/>
+        </p:spPr>
+      </p:pic>
+      <p:cxnSp>
+        <p:nvCxnSpPr>
+          <p:cNvPr id="14" name="Straight Connector 13">
+            <a:extLst>
+              <a:ext uri="{FF2B5EF4-FFF2-40B4-BE49-F238E27FC236}">
+                <a16:creationId xmlns:a16="http://schemas.microsoft.com/office/drawing/2014/main" id="{A7F400EE-A8A5-48AF-B4D6-291B52C6F0B0}"/>
+              </a:ext>
+              <a:ext uri="{C183D7F6-B498-43B3-948B-1728B52AA6E4}">
+                <adec:decorative xmlns:adec="http://schemas.microsoft.com/office/drawing/2017/decorative" val="1"/>
+              </a:ext>
+            </a:extLst>
+          </p:cNvPr>
+          <p:cNvCxnSpPr>
+            <a:cxnSpLocks noGrp="1" noRot="1" noChangeAspect="1" noMove="1" noResize="1" noEditPoints="1" noAdjustHandles="1" noChangeArrowheads="1" noChangeShapeType="1"/>
+          </p:cNvCxnSpPr>
+          <p:nvPr>
+            <p:extLst>
+              <p:ext uri="{386F3935-93C4-4BCD-93E2-E3B085C9AB24}">
+                <p16:designElem xmlns:p16="http://schemas.microsoft.com/office/powerpoint/2015/main" val="1"/>
+              </p:ext>
+            </p:extLst>
+          </p:nvPr>
+        </p:nvCxnSpPr>
+        <p:spPr>
+          <a:xfrm>
+            <a:off x="5080934" y="2115117"/>
+            <a:ext cx="6309360" cy="0"/>
+          </a:xfrm>
+          <a:prstGeom prst="line">
+            <a:avLst/>
+          </a:prstGeom>
+          <a:ln w="19050">
+            <a:solidFill>
+              <a:srgbClr val="D7A963"/>
+            </a:solidFill>
+          </a:ln>
+        </p:spPr>
+        <p:style>
+          <a:lnRef idx="1">
+            <a:schemeClr val="accent1"/>
+          </a:lnRef>
+          <a:fillRef idx="0">
+            <a:schemeClr val="accent1"/>
+          </a:fillRef>
+          <a:effectRef idx="0">
+            <a:schemeClr val="accent1"/>
+          </a:effectRef>
+          <a:fontRef idx="minor">
+            <a:schemeClr val="tx1"/>
+          </a:fontRef>
+        </p:style>
+      </p:cxnSp>
+      <p:sp>
+        <p:nvSpPr>
+          <p:cNvPr id="6" name="TextBox 5">
+            <a:extLst>
+              <a:ext uri="{FF2B5EF4-FFF2-40B4-BE49-F238E27FC236}">
+                <a16:creationId xmlns:a16="http://schemas.microsoft.com/office/drawing/2014/main" id="{B0DF1CC5-5349-6E4C-8E8B-65572FD9D920}"/>
+              </a:ext>
+            </a:extLst>
+          </p:cNvPr>
+          <p:cNvSpPr txBox="1"/>
+          <p:nvPr/>
+        </p:nvSpPr>
+        <p:spPr>
+          <a:xfrm>
+            <a:off x="0" y="6580991"/>
+            <a:ext cx="3394712" cy="276999"/>
+          </a:xfrm>
+          <a:prstGeom prst="rect">
+            <a:avLst/>
+          </a:prstGeom>
+          <a:noFill/>
+        </p:spPr>
+        <p:txBody>
+          <a:bodyPr wrap="none" rtlCol="0">
+            <a:spAutoFit/>
+          </a:bodyPr>
+          <a:lstStyle/>
+          <a:p>
+            <a:r>
+              <a:rPr lang="en-US" sz="1200" dirty="0">
+                <a:solidFill>
+                  <a:schemeClr val="bg1"/>
+                </a:solidFill>
+              </a:rPr>
+              <a:t>*data and image based on HTC 2018 Annual Report</a:t>
             </a:r>
           </a:p>
         </p:txBody>
@@ -3640,7 +3807,7 @@
     </p:spTree>
     <p:extLst>
       <p:ext uri="{BB962C8B-B14F-4D97-AF65-F5344CB8AC3E}">
-        <p14:creationId xmlns:p14="http://schemas.microsoft.com/office/powerpoint/2010/main" val="913840101"/>
+        <p14:creationId xmlns:p14="http://schemas.microsoft.com/office/powerpoint/2010/main" val="4045571101"/>
       </p:ext>
     </p:extLst>
   </p:cSld>
@@ -3675,172 +3842,226 @@
           <a:chExt cx="0" cy="0"/>
         </a:xfrm>
       </p:grpSpPr>
-      <p:sp>
-        <p:nvSpPr>
-          <p:cNvPr id="2" name="Title 1">
-            <a:extLst>
-              <a:ext uri="{FF2B5EF4-FFF2-40B4-BE49-F238E27FC236}">
-                <a16:creationId xmlns:a16="http://schemas.microsoft.com/office/drawing/2014/main" id="{95872C99-5FC9-C64C-BB06-D6D19BC28B46}"/>
-              </a:ext>
-            </a:extLst>
-          </p:cNvPr>
-          <p:cNvSpPr>
-            <a:spLocks noGrp="1"/>
-          </p:cNvSpPr>
-          <p:nvPr>
-            <p:ph type="title"/>
-          </p:nvPr>
-        </p:nvSpPr>
-        <p:spPr>
-          <a:xfrm>
-            <a:off x="4965430" y="629268"/>
-            <a:ext cx="6586491" cy="1286160"/>
-          </a:xfrm>
-        </p:spPr>
-        <p:txBody>
-          <a:bodyPr anchor="b">
-            <a:normAutofit/>
-          </a:bodyPr>
-          <a:lstStyle/>
-          <a:p>
-            <a:r>
-              <a:rPr lang="en-US"/>
-              <a:t>HTC</a:t>
-            </a:r>
-            <a:endParaRPr lang="en-US" dirty="0"/>
-          </a:p>
-        </p:txBody>
-      </p:sp>
-      <p:sp>
-        <p:nvSpPr>
-          <p:cNvPr id="9" name="Content Placeholder 8">
-            <a:extLst>
-              <a:ext uri="{FF2B5EF4-FFF2-40B4-BE49-F238E27FC236}">
-                <a16:creationId xmlns:a16="http://schemas.microsoft.com/office/drawing/2014/main" id="{FE25E03D-2C79-4F0E-943D-C4B4C75A851A}"/>
-              </a:ext>
-            </a:extLst>
-          </p:cNvPr>
-          <p:cNvSpPr>
-            <a:spLocks noGrp="1"/>
-          </p:cNvSpPr>
-          <p:nvPr>
-            <p:ph idx="1"/>
-          </p:nvPr>
-        </p:nvSpPr>
-        <p:spPr>
-          <a:xfrm>
-            <a:off x="4965431" y="2438400"/>
-            <a:ext cx="6586489" cy="3785419"/>
-          </a:xfrm>
-        </p:spPr>
-        <p:txBody>
-          <a:bodyPr>
-            <a:normAutofit/>
-          </a:bodyPr>
-          <a:lstStyle/>
-          <a:p>
-            <a:r>
-              <a:rPr lang="en-US" sz="2000" dirty="0"/>
-              <a:t>January 2018 business cooperation with Google Inc ($1Billion to HTC)</a:t>
-            </a:r>
-          </a:p>
-          <a:p>
-            <a:r>
-              <a:rPr lang="en-US" sz="2000" dirty="0"/>
-              <a:t>Contributed to net income NT$12.0 Billion, EPS NT$14,72</a:t>
-            </a:r>
-          </a:p>
-          <a:p>
-            <a:endParaRPr lang="en-US" sz="2000" dirty="0"/>
-          </a:p>
-        </p:txBody>
-      </p:sp>
       <p:pic>
         <p:nvPicPr>
-          <p:cNvPr id="5" name="Content Placeholder 4" descr="A screen shot of a computer&#10;&#10;Description automatically generated">
-            <a:extLst>
-              <a:ext uri="{FF2B5EF4-FFF2-40B4-BE49-F238E27FC236}">
-                <a16:creationId xmlns:a16="http://schemas.microsoft.com/office/drawing/2014/main" id="{58042339-4096-5944-B9E8-04B91EB71AAA}"/>
+          <p:cNvPr id="5" name="Content Placeholder 4" descr="A screenshot of a cell phone&#10;&#10;Description automatically generated">
+            <a:extLst>
+              <a:ext uri="{FF2B5EF4-FFF2-40B4-BE49-F238E27FC236}">
+                <a16:creationId xmlns:a16="http://schemas.microsoft.com/office/drawing/2014/main" id="{0021182A-ABFF-CD4E-9C2D-45A11B1DF091}"/>
               </a:ext>
             </a:extLst>
           </p:cNvPr>
           <p:cNvPicPr>
-            <a:picLocks noChangeAspect="1"/>
+            <a:picLocks noGrp="1" noChangeAspect="1"/>
           </p:cNvPicPr>
-          <p:nvPr/>
+          <p:nvPr>
+            <p:ph idx="1"/>
+          </p:nvPr>
         </p:nvPicPr>
         <p:blipFill rotWithShape="1">
           <a:blip r:embed="rId2"/>
-          <a:srcRect l="6445"/>
+          <a:srcRect l="23" r="864" b="-1"/>
           <a:stretch/>
         </p:blipFill>
         <p:spPr>
           <a:xfrm>
             <a:off x="20" y="10"/>
-            <a:ext cx="4635571" cy="6857990"/>
+            <a:ext cx="12191980" cy="6857990"/>
           </a:xfrm>
           <a:prstGeom prst="rect">
             <a:avLst/>
           </a:prstGeom>
-          <a:effectLst/>
         </p:spPr>
       </p:pic>
-      <p:cxnSp>
-        <p:nvCxnSpPr>
-          <p:cNvPr id="14" name="Straight Connector 13">
-            <a:extLst>
-              <a:ext uri="{FF2B5EF4-FFF2-40B4-BE49-F238E27FC236}">
-                <a16:creationId xmlns:a16="http://schemas.microsoft.com/office/drawing/2014/main" id="{A7F400EE-A8A5-48AF-B4D6-291B52C6F0B0}"/>
-              </a:ext>
-              <a:ext uri="{C183D7F6-B498-43B3-948B-1728B52AA6E4}">
-                <adec:decorative xmlns:adec="http://schemas.microsoft.com/office/drawing/2017/decorative" val="1"/>
-              </a:ext>
-            </a:extLst>
-          </p:cNvPr>
-          <p:cNvCxnSpPr>
-            <a:cxnSpLocks noGrp="1" noRot="1" noChangeAspect="1" noMove="1" noResize="1" noEditPoints="1" noAdjustHandles="1" noChangeArrowheads="1" noChangeShapeType="1"/>
-          </p:cNvCxnSpPr>
-          <p:nvPr>
-            <p:extLst>
-              <p:ext uri="{386F3935-93C4-4BCD-93E2-E3B085C9AB24}">
-                <p16:designElem xmlns:p16="http://schemas.microsoft.com/office/powerpoint/2015/main" val="1"/>
-              </p:ext>
-            </p:extLst>
-          </p:nvPr>
-        </p:nvCxnSpPr>
-        <p:spPr>
-          <a:xfrm>
-            <a:off x="5080934" y="2115117"/>
-            <a:ext cx="6309360" cy="0"/>
-          </a:xfrm>
-          <a:prstGeom prst="line">
-            <a:avLst/>
-          </a:prstGeom>
-          <a:ln w="19050">
-            <a:solidFill>
-              <a:srgbClr val="D7A963"/>
-            </a:solidFill>
-          </a:ln>
-        </p:spPr>
-        <p:style>
-          <a:lnRef idx="1">
-            <a:schemeClr val="accent1"/>
-          </a:lnRef>
-          <a:fillRef idx="0">
-            <a:schemeClr val="accent1"/>
-          </a:fillRef>
-          <a:effectRef idx="0">
-            <a:schemeClr val="accent1"/>
-          </a:effectRef>
-          <a:fontRef idx="minor">
-            <a:schemeClr val="tx1"/>
-          </a:fontRef>
-        </p:style>
-      </p:cxnSp>
     </p:spTree>
     <p:extLst>
       <p:ext uri="{BB962C8B-B14F-4D97-AF65-F5344CB8AC3E}">
-        <p14:creationId xmlns:p14="http://schemas.microsoft.com/office/powerpoint/2010/main" val="4045571101"/>
+        <p14:creationId xmlns:p14="http://schemas.microsoft.com/office/powerpoint/2010/main" val="3648548494"/>
+      </p:ext>
+    </p:extLst>
+  </p:cSld>
+  <p:clrMapOvr>
+    <a:masterClrMapping/>
+  </p:clrMapOvr>
+</p:sld>
+</file>
+
+<file path=ppt/slides/slide5.xml><?xml version="1.0" encoding="utf-8"?>
+<p:sld xmlns:a="http://schemas.openxmlformats.org/drawingml/2006/main" xmlns:r="http://schemas.openxmlformats.org/officeDocument/2006/relationships" xmlns:p="http://schemas.openxmlformats.org/presentationml/2006/main">
+  <p:cSld>
+    <p:spTree>
+      <p:nvGrpSpPr>
+        <p:cNvPr id="1" name=""/>
+        <p:cNvGrpSpPr/>
+        <p:nvPr/>
+      </p:nvGrpSpPr>
+      <p:grpSpPr>
+        <a:xfrm>
+          <a:off x="0" y="0"/>
+          <a:ext cx="0" cy="0"/>
+          <a:chOff x="0" y="0"/>
+          <a:chExt cx="0" cy="0"/>
+        </a:xfrm>
+      </p:grpSpPr>
+      <p:sp>
+        <p:nvSpPr>
+          <p:cNvPr id="2" name="Title 1">
+            <a:extLst>
+              <a:ext uri="{FF2B5EF4-FFF2-40B4-BE49-F238E27FC236}">
+                <a16:creationId xmlns:a16="http://schemas.microsoft.com/office/drawing/2014/main" id="{871662E3-AD8B-8346-A30B-5AB3899B1678}"/>
+              </a:ext>
+            </a:extLst>
+          </p:cNvPr>
+          <p:cNvSpPr>
+            <a:spLocks noGrp="1"/>
+          </p:cNvSpPr>
+          <p:nvPr>
+            <p:ph type="title"/>
+          </p:nvPr>
+        </p:nvSpPr>
+        <p:spPr/>
+        <p:txBody>
+          <a:bodyPr/>
+          <a:lstStyle/>
+          <a:p>
+            <a:r>
+              <a:rPr lang="en-US" dirty="0"/>
+              <a:t>Oculus by Facebook</a:t>
+            </a:r>
+          </a:p>
+        </p:txBody>
+      </p:sp>
+      <p:sp>
+        <p:nvSpPr>
+          <p:cNvPr id="3" name="Content Placeholder 2">
+            <a:extLst>
+              <a:ext uri="{FF2B5EF4-FFF2-40B4-BE49-F238E27FC236}">
+                <a16:creationId xmlns:a16="http://schemas.microsoft.com/office/drawing/2014/main" id="{8728D987-644F-3245-ABA2-B2611EF61EE8}"/>
+              </a:ext>
+            </a:extLst>
+          </p:cNvPr>
+          <p:cNvSpPr>
+            <a:spLocks noGrp="1"/>
+          </p:cNvSpPr>
+          <p:nvPr>
+            <p:ph idx="1"/>
+          </p:nvPr>
+        </p:nvSpPr>
+        <p:spPr/>
+        <p:txBody>
+          <a:bodyPr/>
+          <a:lstStyle/>
+          <a:p>
+            <a:r>
+              <a:rPr lang="en-ID" dirty="0"/>
+              <a:t>Facebook has pumped billions into VR</a:t>
+            </a:r>
+            <a:endParaRPr lang="en-US" dirty="0">
+              <a:hlinkClick r:id="rId2"/>
+            </a:endParaRPr>
+          </a:p>
+          <a:p>
+            <a:r>
+              <a:rPr lang="en-US" dirty="0">
+                <a:hlinkClick r:id="rId2"/>
+              </a:rPr>
+              <a:t>$100 Million in Revenue</a:t>
+            </a:r>
+            <a:endParaRPr lang="en-US" dirty="0"/>
+          </a:p>
+          <a:p>
+            <a:pPr lvl="1"/>
+            <a:r>
+              <a:rPr lang="en-US" dirty="0"/>
+              <a:t>20% (contributed by users spending on content)</a:t>
+            </a:r>
+          </a:p>
+        </p:txBody>
+      </p:sp>
+    </p:spTree>
+    <p:extLst>
+      <p:ext uri="{BB962C8B-B14F-4D97-AF65-F5344CB8AC3E}">
+        <p14:creationId xmlns:p14="http://schemas.microsoft.com/office/powerpoint/2010/main" val="913840101"/>
+      </p:ext>
+    </p:extLst>
+  </p:cSld>
+  <p:clrMapOvr>
+    <a:masterClrMapping/>
+  </p:clrMapOvr>
+</p:sld>
+</file>
+
+<file path=ppt/slides/slide6.xml><?xml version="1.0" encoding="utf-8"?>
+<p:sld xmlns:a="http://schemas.openxmlformats.org/drawingml/2006/main" xmlns:r="http://schemas.openxmlformats.org/officeDocument/2006/relationships" xmlns:p="http://schemas.openxmlformats.org/presentationml/2006/main">
+  <p:cSld>
+    <p:spTree>
+      <p:nvGrpSpPr>
+        <p:cNvPr id="1" name=""/>
+        <p:cNvGrpSpPr/>
+        <p:nvPr/>
+      </p:nvGrpSpPr>
+      <p:grpSpPr>
+        <a:xfrm>
+          <a:off x="0" y="0"/>
+          <a:ext cx="0" cy="0"/>
+          <a:chOff x="0" y="0"/>
+          <a:chExt cx="0" cy="0"/>
+        </a:xfrm>
+      </p:grpSpPr>
+      <p:sp>
+        <p:nvSpPr>
+          <p:cNvPr id="2" name="Title 1">
+            <a:extLst>
+              <a:ext uri="{FF2B5EF4-FFF2-40B4-BE49-F238E27FC236}">
+                <a16:creationId xmlns:a16="http://schemas.microsoft.com/office/drawing/2014/main" id="{EC174F78-6B6F-934B-BA9E-6C49A9E9EB5A}"/>
+              </a:ext>
+            </a:extLst>
+          </p:cNvPr>
+          <p:cNvSpPr>
+            <a:spLocks noGrp="1"/>
+          </p:cNvSpPr>
+          <p:nvPr>
+            <p:ph type="title"/>
+          </p:nvPr>
+        </p:nvSpPr>
+        <p:spPr/>
+        <p:txBody>
+          <a:bodyPr/>
+          <a:lstStyle/>
+          <a:p>
+            <a:endParaRPr lang="en-US"/>
+          </a:p>
+        </p:txBody>
+      </p:sp>
+      <p:sp>
+        <p:nvSpPr>
+          <p:cNvPr id="3" name="Content Placeholder 2">
+            <a:extLst>
+              <a:ext uri="{FF2B5EF4-FFF2-40B4-BE49-F238E27FC236}">
+                <a16:creationId xmlns:a16="http://schemas.microsoft.com/office/drawing/2014/main" id="{C491EC7B-E94F-2E48-A73E-FE8938D3A974}"/>
+              </a:ext>
+            </a:extLst>
+          </p:cNvPr>
+          <p:cNvSpPr>
+            <a:spLocks noGrp="1"/>
+          </p:cNvSpPr>
+          <p:nvPr>
+            <p:ph idx="1"/>
+          </p:nvPr>
+        </p:nvSpPr>
+        <p:spPr/>
+        <p:txBody>
+          <a:bodyPr/>
+          <a:lstStyle/>
+          <a:p>
+            <a:endParaRPr lang="en-US"/>
+          </a:p>
+        </p:txBody>
+      </p:sp>
+    </p:spTree>
+    <p:extLst>
+      <p:ext uri="{BB962C8B-B14F-4D97-AF65-F5344CB8AC3E}">
+        <p14:creationId xmlns:p14="http://schemas.microsoft.com/office/powerpoint/2010/main" val="392075372"/>
       </p:ext>
     </p:extLst>
   </p:cSld>

</xml_diff>